<commit_message>
presentation - updated pictures
</commit_message>
<xml_diff>
--- a/PiAndMore/Part-0--Presentation/A lesson of physical Computing with Scratch.pptx
+++ b/PiAndMore/Part-0--Presentation/A lesson of physical Computing with Scratch.pptx
@@ -3777,11 +3777,7 @@
           <a:p>
             <a:r>
               <a:rPr lang="en-US" dirty="0" smtClean="0"/>
-              <a:t>Input / output </a:t>
-            </a:r>
-            <a:r>
-              <a:rPr lang="en-US" dirty="0" smtClean="0"/>
-              <a:t>…</a:t>
+              <a:t>Input / output …</a:t>
             </a:r>
           </a:p>
           <a:p>
@@ -6983,13 +6979,13 @@
         </p:nvSpPr>
         <p:spPr>
           <a:xfrm>
-            <a:off x="467544" y="1203598"/>
-            <a:ext cx="2674640" cy="3391024"/>
+            <a:off x="467544" y="987574"/>
+            <a:ext cx="2674640" cy="3607048"/>
           </a:xfrm>
         </p:spPr>
         <p:txBody>
           <a:bodyPr>
-            <a:normAutofit fontScale="55000" lnSpcReduction="20000"/>
+            <a:noAutofit/>
           </a:bodyPr>
           <a:lstStyle/>
           <a:p>
@@ -6997,7 +6993,7 @@
               <a:buNone/>
             </a:pPr>
             <a:r>
-              <a:rPr lang="en-US" dirty="0" smtClean="0"/>
+              <a:rPr lang="en-US" sz="1400" b="1" dirty="0" smtClean="0"/>
               <a:t>Lesson 1</a:t>
             </a:r>
           </a:p>
@@ -7005,74 +7001,74 @@
             <a:pPr>
               <a:buNone/>
             </a:pPr>
-            <a:endParaRPr lang="en-US" dirty="0" smtClean="0"/>
+            <a:endParaRPr lang="en-US" sz="1400" dirty="0" smtClean="0"/>
           </a:p>
           <a:p>
             <a:pPr>
               <a:buNone/>
             </a:pPr>
-            <a:endParaRPr lang="en-US" dirty="0" smtClean="0"/>
+            <a:endParaRPr lang="en-US" sz="1400" dirty="0" smtClean="0"/>
           </a:p>
           <a:p>
             <a:pPr>
               <a:buNone/>
             </a:pPr>
-            <a:endParaRPr lang="en-US" dirty="0" smtClean="0"/>
+            <a:endParaRPr lang="en-US" sz="1400" dirty="0" smtClean="0"/>
           </a:p>
           <a:p>
             <a:pPr>
               <a:buNone/>
             </a:pPr>
-            <a:endParaRPr lang="en-US" dirty="0" smtClean="0"/>
+            <a:endParaRPr lang="en-US" sz="1400" dirty="0" smtClean="0"/>
           </a:p>
           <a:p>
             <a:pPr>
               <a:buNone/>
             </a:pPr>
-            <a:endParaRPr lang="en-US" dirty="0" smtClean="0"/>
+            <a:endParaRPr lang="en-US" sz="1400" dirty="0" smtClean="0"/>
           </a:p>
           <a:p>
             <a:pPr>
               <a:buNone/>
             </a:pPr>
-            <a:endParaRPr lang="en-US" dirty="0" smtClean="0"/>
+            <a:endParaRPr lang="en-US" sz="1400" dirty="0" smtClean="0"/>
           </a:p>
           <a:p>
             <a:pPr>
               <a:buNone/>
             </a:pPr>
-            <a:endParaRPr lang="en-US" dirty="0" smtClean="0"/>
+            <a:endParaRPr lang="en-US" sz="1400" dirty="0" smtClean="0"/>
           </a:p>
           <a:p>
             <a:pPr>
               <a:buNone/>
             </a:pPr>
-            <a:endParaRPr lang="en-US" dirty="0" smtClean="0"/>
+            <a:endParaRPr lang="en-US" sz="1400" dirty="0" smtClean="0"/>
           </a:p>
           <a:p>
             <a:pPr>
               <a:buNone/>
             </a:pPr>
-            <a:endParaRPr lang="en-US" dirty="0" smtClean="0"/>
+            <a:endParaRPr lang="en-US" sz="1400" dirty="0" smtClean="0"/>
           </a:p>
           <a:p>
             <a:pPr>
               <a:buNone/>
             </a:pPr>
-            <a:endParaRPr lang="en-US" dirty="0" smtClean="0"/>
-          </a:p>
-          <a:p>
-            <a:r>
-              <a:rPr lang="en-US" dirty="0" smtClean="0"/>
+            <a:endParaRPr lang="en-US" sz="1400" dirty="0" smtClean="0"/>
+          </a:p>
+          <a:p>
+            <a:r>
+              <a:rPr lang="en-US" sz="1200" dirty="0" smtClean="0"/>
               <a:t>Program a game in Scratch, output on monitor. </a:t>
             </a:r>
           </a:p>
           <a:p>
             <a:r>
-              <a:rPr lang="en-US" dirty="0" smtClean="0"/>
+              <a:rPr lang="en-US" sz="1200" dirty="0" smtClean="0"/>
               <a:t>1 helper per 8 students.</a:t>
             </a:r>
-            <a:endParaRPr lang="nl-NL" dirty="0"/>
+            <a:endParaRPr lang="nl-NL" sz="1200" dirty="0"/>
           </a:p>
         </p:txBody>
       </p:sp>
@@ -7088,13 +7084,13 @@
         </p:nvSpPr>
         <p:spPr>
           <a:xfrm>
-            <a:off x="6012160" y="1203598"/>
-            <a:ext cx="2674640" cy="3394472"/>
+            <a:off x="6012160" y="987574"/>
+            <a:ext cx="2674640" cy="3672408"/>
           </a:xfrm>
         </p:spPr>
         <p:txBody>
           <a:bodyPr>
-            <a:normAutofit fontScale="55000" lnSpcReduction="20000"/>
+            <a:normAutofit fontScale="32500" lnSpcReduction="20000"/>
           </a:bodyPr>
           <a:lstStyle/>
           <a:p>
@@ -7102,7 +7098,7 @@
               <a:buNone/>
             </a:pPr>
             <a:r>
-              <a:rPr lang="en-US" dirty="0" smtClean="0"/>
+              <a:rPr lang="en-US" sz="4300" b="1" dirty="0" smtClean="0"/>
               <a:t>Lesson 3</a:t>
             </a:r>
           </a:p>
@@ -7113,39 +7109,161 @@
             <a:endParaRPr lang="en-US" dirty="0" smtClean="0"/>
           </a:p>
           <a:p>
-            <a:r>
-              <a:rPr lang="en-US" sz="1800" dirty="0" smtClean="0"/>
-              <a:t>program an </a:t>
-            </a:r>
-            <a:r>
-              <a:rPr lang="en-US" sz="1800" dirty="0" err="1" smtClean="0"/>
+            <a:pPr>
+              <a:buNone/>
+            </a:pPr>
+            <a:endParaRPr lang="en-US" dirty="0" smtClean="0"/>
+          </a:p>
+          <a:p>
+            <a:pPr>
+              <a:buNone/>
+            </a:pPr>
+            <a:endParaRPr lang="en-US" dirty="0" smtClean="0"/>
+          </a:p>
+          <a:p>
+            <a:pPr>
+              <a:buNone/>
+            </a:pPr>
+            <a:endParaRPr lang="en-US" dirty="0" smtClean="0"/>
+          </a:p>
+          <a:p>
+            <a:pPr>
+              <a:buNone/>
+            </a:pPr>
+            <a:endParaRPr lang="en-US" dirty="0" smtClean="0"/>
+          </a:p>
+          <a:p>
+            <a:pPr>
+              <a:buNone/>
+            </a:pPr>
+            <a:endParaRPr lang="en-US" dirty="0" smtClean="0"/>
+          </a:p>
+          <a:p>
+            <a:pPr>
+              <a:buNone/>
+            </a:pPr>
+            <a:endParaRPr lang="en-US" dirty="0" smtClean="0"/>
+          </a:p>
+          <a:p>
+            <a:pPr>
+              <a:buNone/>
+            </a:pPr>
+            <a:endParaRPr lang="en-US" dirty="0" smtClean="0"/>
+          </a:p>
+          <a:p>
+            <a:pPr>
+              <a:buNone/>
+            </a:pPr>
+            <a:endParaRPr lang="en-US" dirty="0" smtClean="0"/>
+          </a:p>
+          <a:p>
+            <a:pPr>
+              <a:buNone/>
+            </a:pPr>
+            <a:endParaRPr lang="en-US" dirty="0" smtClean="0"/>
+          </a:p>
+          <a:p>
+            <a:pPr>
+              <a:buNone/>
+            </a:pPr>
+            <a:endParaRPr lang="en-US" dirty="0" smtClean="0"/>
+          </a:p>
+          <a:p>
+            <a:pPr>
+              <a:buNone/>
+            </a:pPr>
+            <a:endParaRPr lang="en-US" dirty="0" smtClean="0"/>
+          </a:p>
+          <a:p>
+            <a:pPr>
+              <a:buNone/>
+            </a:pPr>
+            <a:endParaRPr lang="en-US" dirty="0" smtClean="0"/>
+          </a:p>
+          <a:p>
+            <a:pPr>
+              <a:buNone/>
+            </a:pPr>
+            <a:endParaRPr lang="en-US" dirty="0" smtClean="0"/>
+          </a:p>
+          <a:p>
+            <a:pPr>
+              <a:buNone/>
+            </a:pPr>
+            <a:endParaRPr lang="en-US" dirty="0" smtClean="0"/>
+          </a:p>
+          <a:p>
+            <a:pPr>
+              <a:buNone/>
+            </a:pPr>
+            <a:endParaRPr lang="en-US" dirty="0" smtClean="0"/>
+          </a:p>
+          <a:p>
+            <a:pPr>
+              <a:buNone/>
+            </a:pPr>
+            <a:endParaRPr lang="en-US" dirty="0" smtClean="0"/>
+          </a:p>
+          <a:p>
+            <a:pPr>
+              <a:buNone/>
+            </a:pPr>
+            <a:endParaRPr lang="en-US" dirty="0" smtClean="0"/>
+          </a:p>
+          <a:p>
+            <a:pPr>
+              <a:buNone/>
+            </a:pPr>
+            <a:endParaRPr lang="en-US" dirty="0" smtClean="0"/>
+          </a:p>
+          <a:p>
+            <a:pPr>
+              <a:buNone/>
+            </a:pPr>
+            <a:endParaRPr lang="en-US" dirty="0" smtClean="0"/>
+          </a:p>
+          <a:p>
+            <a:r>
+              <a:rPr lang="en-US" sz="3400" dirty="0" smtClean="0"/>
+              <a:t>P</a:t>
+            </a:r>
+            <a:r>
+              <a:rPr lang="en-US" sz="3400" dirty="0" smtClean="0"/>
+              <a:t>rogram </a:t>
+            </a:r>
+            <a:r>
+              <a:rPr lang="en-US" sz="3400" dirty="0" smtClean="0"/>
+              <a:t>an </a:t>
+            </a:r>
+            <a:r>
+              <a:rPr lang="en-US" sz="3400" dirty="0" err="1" smtClean="0"/>
               <a:t>Arduino</a:t>
             </a:r>
             <a:r>
-              <a:rPr lang="en-US" sz="1800" dirty="0" smtClean="0"/>
+              <a:rPr lang="en-US" sz="3400" dirty="0" smtClean="0"/>
               <a:t> </a:t>
             </a:r>
             <a:r>
-              <a:rPr lang="en-US" sz="1800" dirty="0" err="1" smtClean="0"/>
+              <a:rPr lang="en-US" sz="3400" dirty="0" err="1" smtClean="0"/>
               <a:t>Nano</a:t>
             </a:r>
             <a:r>
-              <a:rPr lang="en-US" sz="1800" dirty="0" smtClean="0"/>
+              <a:rPr lang="en-US" sz="3400" dirty="0" smtClean="0"/>
               <a:t> from </a:t>
             </a:r>
             <a:r>
-              <a:rPr lang="en-US" sz="1800" dirty="0" err="1" smtClean="0"/>
+              <a:rPr lang="en-US" sz="3400" dirty="0" err="1" smtClean="0"/>
               <a:t>Rpi</a:t>
             </a:r>
             <a:r>
-              <a:rPr lang="en-US" sz="1800" dirty="0" smtClean="0"/>
+              <a:rPr lang="en-US" sz="3400" dirty="0" smtClean="0"/>
               <a:t>. Complete the electronic circuit of a game to be able to take home. 1 helper per 2 students.</a:t>
             </a:r>
           </a:p>
           <a:p>
             <a:pPr lvl="1"/>
             <a:r>
-              <a:rPr lang="en-US" sz="1400" dirty="0" smtClean="0"/>
+              <a:rPr lang="en-US" sz="1700" dirty="0" smtClean="0"/>
               <a:t>Could also be done in 2 lessons.</a:t>
             </a:r>
           </a:p>
@@ -7198,8 +7316,8 @@
         </p:blipFill>
         <p:spPr bwMode="auto">
           <a:xfrm>
-            <a:off x="539552" y="1563638"/>
-            <a:ext cx="2268438" cy="2160239"/>
+            <a:off x="539552" y="1275607"/>
+            <a:ext cx="2570898" cy="2448272"/>
           </a:xfrm>
           <a:prstGeom prst="rect">
             <a:avLst/>
@@ -7281,8 +7399,8 @@
         </p:nvSpPr>
         <p:spPr>
           <a:xfrm>
-            <a:off x="3203848" y="1203598"/>
-            <a:ext cx="2674640" cy="3394472"/>
+            <a:off x="3203848" y="987574"/>
+            <a:ext cx="2674640" cy="3672408"/>
           </a:xfrm>
           <a:prstGeom prst="rect">
             <a:avLst/>
@@ -7290,7 +7408,7 @@
         </p:spPr>
         <p:txBody>
           <a:bodyPr vert="horz" lIns="91440" tIns="45720" rIns="91440" bIns="45720" rtlCol="0">
-            <a:normAutofit/>
+            <a:normAutofit fontScale="85000" lnSpcReduction="20000"/>
           </a:bodyPr>
           <a:lstStyle/>
           <a:p>
@@ -7310,7 +7428,7 @@
               <a:defRPr/>
             </a:pPr>
             <a:r>
-              <a:rPr kumimoji="0" lang="en-US" sz="2800" b="0" i="0" u="none" strike="noStrike" kern="1200" cap="none" spc="0" normalizeH="0" baseline="0" noProof="0" dirty="0" smtClean="0">
+              <a:rPr kumimoji="0" lang="en-US" sz="1500" b="1" i="0" u="none" strike="noStrike" kern="1200" cap="none" spc="0" normalizeH="0" baseline="0" noProof="0" dirty="0" smtClean="0">
                 <a:ln>
                   <a:noFill/>
                 </a:ln>
@@ -7324,20 +7442,24 @@
                 <a:ea typeface="+mn-ea"/>
                 <a:cs typeface="+mn-cs"/>
               </a:rPr>
-              <a:t>Lesson 2</a:t>
-            </a:r>
-          </a:p>
-          <a:p>
-            <a:r>
-              <a:rPr lang="en-US" dirty="0" smtClean="0"/>
-              <a:t>physical computing controlled from Scratch. 1 helper per 4 students.</a:t>
-            </a:r>
-          </a:p>
-          <a:p>
-            <a:pPr lvl="1"/>
-            <a:r>
-              <a:rPr lang="en-US" sz="1400" dirty="0" smtClean="0"/>
-              <a:t>Could also be done in 2 lessons.</a:t>
+              <a:t>Lesson </a:t>
+            </a:r>
+            <a:r>
+              <a:rPr kumimoji="0" lang="en-US" sz="1500" b="1" i="0" u="none" strike="noStrike" kern="1200" cap="none" spc="0" normalizeH="0" baseline="0" noProof="0" dirty="0" smtClean="0">
+                <a:ln>
+                  <a:noFill/>
+                </a:ln>
+                <a:solidFill>
+                  <a:schemeClr val="tx1"/>
+                </a:solidFill>
+                <a:effectLst/>
+                <a:uLnTx/>
+                <a:uFillTx/>
+                <a:latin typeface="+mn-lt"/>
+                <a:ea typeface="+mn-ea"/>
+                <a:cs typeface="+mn-cs"/>
+              </a:rPr>
+              <a:t>2</a:t>
             </a:r>
           </a:p>
           <a:p>
@@ -7356,7 +7478,470 @@
               <a:tabLst/>
               <a:defRPr/>
             </a:pPr>
-            <a:endParaRPr kumimoji="0" lang="nl-NL" sz="2800" b="0" i="0" u="none" strike="noStrike" kern="1200" cap="none" spc="0" normalizeH="0" baseline="0" noProof="0" dirty="0">
+            <a:endParaRPr lang="en-US" sz="1300" dirty="0" smtClean="0"/>
+          </a:p>
+          <a:p>
+            <a:pPr marL="179388" marR="0" lvl="0" indent="-179388" algn="l" defTabSz="914400" rtl="0" eaLnBrk="1" fontAlgn="auto" latinLnBrk="0" hangingPunct="1">
+              <a:lnSpc>
+                <a:spcPct val="100000"/>
+              </a:lnSpc>
+              <a:spcBef>
+                <a:spcPct val="20000"/>
+              </a:spcBef>
+              <a:spcAft>
+                <a:spcPts val="0"/>
+              </a:spcAft>
+              <a:buClrTx/>
+              <a:buSzTx/>
+              <a:tabLst/>
+              <a:defRPr/>
+            </a:pPr>
+            <a:endParaRPr kumimoji="0" lang="en-US" sz="1300" b="0" i="0" u="none" strike="noStrike" kern="1200" cap="none" spc="0" normalizeH="0" baseline="0" noProof="0" dirty="0" smtClean="0">
+              <a:ln>
+                <a:noFill/>
+              </a:ln>
+              <a:solidFill>
+                <a:schemeClr val="tx1"/>
+              </a:solidFill>
+              <a:effectLst/>
+              <a:uLnTx/>
+              <a:uFillTx/>
+              <a:latin typeface="+mn-lt"/>
+              <a:ea typeface="+mn-ea"/>
+              <a:cs typeface="+mn-cs"/>
+            </a:endParaRPr>
+          </a:p>
+          <a:p>
+            <a:pPr marL="179388" marR="0" lvl="0" indent="-179388" algn="l" defTabSz="914400" rtl="0" eaLnBrk="1" fontAlgn="auto" latinLnBrk="0" hangingPunct="1">
+              <a:lnSpc>
+                <a:spcPct val="100000"/>
+              </a:lnSpc>
+              <a:spcBef>
+                <a:spcPct val="20000"/>
+              </a:spcBef>
+              <a:spcAft>
+                <a:spcPts val="0"/>
+              </a:spcAft>
+              <a:buClrTx/>
+              <a:buSzTx/>
+              <a:tabLst/>
+              <a:defRPr/>
+            </a:pPr>
+            <a:endParaRPr lang="en-US" sz="1200" dirty="0" smtClean="0"/>
+          </a:p>
+          <a:p>
+            <a:pPr marL="179388" marR="0" lvl="0" indent="-179388" algn="l" defTabSz="914400" rtl="0" eaLnBrk="1" fontAlgn="auto" latinLnBrk="0" hangingPunct="1">
+              <a:lnSpc>
+                <a:spcPct val="100000"/>
+              </a:lnSpc>
+              <a:spcBef>
+                <a:spcPct val="20000"/>
+              </a:spcBef>
+              <a:spcAft>
+                <a:spcPts val="0"/>
+              </a:spcAft>
+              <a:buClrTx/>
+              <a:buSzTx/>
+              <a:tabLst/>
+              <a:defRPr/>
+            </a:pPr>
+            <a:endParaRPr kumimoji="0" lang="en-US" sz="1200" b="0" i="0" u="none" strike="noStrike" kern="1200" cap="none" spc="0" normalizeH="0" baseline="0" noProof="0" dirty="0" smtClean="0">
+              <a:ln>
+                <a:noFill/>
+              </a:ln>
+              <a:solidFill>
+                <a:schemeClr val="tx1"/>
+              </a:solidFill>
+              <a:effectLst/>
+              <a:uLnTx/>
+              <a:uFillTx/>
+              <a:latin typeface="+mn-lt"/>
+              <a:ea typeface="+mn-ea"/>
+              <a:cs typeface="+mn-cs"/>
+            </a:endParaRPr>
+          </a:p>
+          <a:p>
+            <a:pPr marL="179388" marR="0" lvl="0" indent="-179388" algn="l" defTabSz="914400" rtl="0" eaLnBrk="1" fontAlgn="auto" latinLnBrk="0" hangingPunct="1">
+              <a:lnSpc>
+                <a:spcPct val="100000"/>
+              </a:lnSpc>
+              <a:spcBef>
+                <a:spcPct val="20000"/>
+              </a:spcBef>
+              <a:spcAft>
+                <a:spcPts val="0"/>
+              </a:spcAft>
+              <a:buClrTx/>
+              <a:buSzTx/>
+              <a:tabLst/>
+              <a:defRPr/>
+            </a:pPr>
+            <a:endParaRPr kumimoji="0" lang="en-US" sz="1200" b="0" i="0" u="none" strike="noStrike" kern="1200" cap="none" spc="0" normalizeH="0" baseline="0" noProof="0" dirty="0" smtClean="0">
+              <a:ln>
+                <a:noFill/>
+              </a:ln>
+              <a:solidFill>
+                <a:schemeClr val="tx1"/>
+              </a:solidFill>
+              <a:effectLst/>
+              <a:uLnTx/>
+              <a:uFillTx/>
+              <a:latin typeface="+mn-lt"/>
+              <a:ea typeface="+mn-ea"/>
+              <a:cs typeface="+mn-cs"/>
+            </a:endParaRPr>
+          </a:p>
+          <a:p>
+            <a:pPr marL="179388" marR="0" lvl="0" indent="-179388" algn="l" defTabSz="914400" rtl="0" eaLnBrk="1" fontAlgn="auto" latinLnBrk="0" hangingPunct="1">
+              <a:lnSpc>
+                <a:spcPct val="100000"/>
+              </a:lnSpc>
+              <a:spcBef>
+                <a:spcPct val="20000"/>
+              </a:spcBef>
+              <a:spcAft>
+                <a:spcPts val="0"/>
+              </a:spcAft>
+              <a:buClrTx/>
+              <a:buSzTx/>
+              <a:tabLst/>
+              <a:defRPr/>
+            </a:pPr>
+            <a:endParaRPr lang="en-US" sz="1200" dirty="0" smtClean="0"/>
+          </a:p>
+          <a:p>
+            <a:pPr marL="179388" marR="0" lvl="0" indent="-179388" algn="l" defTabSz="914400" rtl="0" eaLnBrk="1" fontAlgn="auto" latinLnBrk="0" hangingPunct="1">
+              <a:lnSpc>
+                <a:spcPct val="100000"/>
+              </a:lnSpc>
+              <a:spcBef>
+                <a:spcPct val="20000"/>
+              </a:spcBef>
+              <a:spcAft>
+                <a:spcPts val="0"/>
+              </a:spcAft>
+              <a:buClrTx/>
+              <a:buSzTx/>
+              <a:tabLst/>
+              <a:defRPr/>
+            </a:pPr>
+            <a:endParaRPr kumimoji="0" lang="en-US" sz="1200" b="0" i="0" u="none" strike="noStrike" kern="1200" cap="none" spc="0" normalizeH="0" baseline="0" noProof="0" dirty="0" smtClean="0">
+              <a:ln>
+                <a:noFill/>
+              </a:ln>
+              <a:solidFill>
+                <a:schemeClr val="tx1"/>
+              </a:solidFill>
+              <a:effectLst/>
+              <a:uLnTx/>
+              <a:uFillTx/>
+              <a:latin typeface="+mn-lt"/>
+              <a:ea typeface="+mn-ea"/>
+              <a:cs typeface="+mn-cs"/>
+            </a:endParaRPr>
+          </a:p>
+          <a:p>
+            <a:pPr marL="179388" marR="0" lvl="0" indent="-179388" algn="l" defTabSz="914400" rtl="0" eaLnBrk="1" fontAlgn="auto" latinLnBrk="0" hangingPunct="1">
+              <a:lnSpc>
+                <a:spcPct val="100000"/>
+              </a:lnSpc>
+              <a:spcBef>
+                <a:spcPct val="20000"/>
+              </a:spcBef>
+              <a:spcAft>
+                <a:spcPts val="0"/>
+              </a:spcAft>
+              <a:buClrTx/>
+              <a:buSzTx/>
+              <a:tabLst/>
+              <a:defRPr/>
+            </a:pPr>
+            <a:endParaRPr lang="en-US" sz="1200" dirty="0" smtClean="0"/>
+          </a:p>
+          <a:p>
+            <a:pPr marL="179388" marR="0" lvl="0" indent="-179388" algn="l" defTabSz="914400" rtl="0" eaLnBrk="1" fontAlgn="auto" latinLnBrk="0" hangingPunct="1">
+              <a:lnSpc>
+                <a:spcPct val="100000"/>
+              </a:lnSpc>
+              <a:spcBef>
+                <a:spcPct val="20000"/>
+              </a:spcBef>
+              <a:spcAft>
+                <a:spcPts val="0"/>
+              </a:spcAft>
+              <a:buClrTx/>
+              <a:buSzTx/>
+              <a:tabLst/>
+              <a:defRPr/>
+            </a:pPr>
+            <a:endParaRPr kumimoji="0" lang="en-US" sz="1200" b="0" i="0" u="none" strike="noStrike" kern="1200" cap="none" spc="0" normalizeH="0" baseline="0" noProof="0" dirty="0" smtClean="0">
+              <a:ln>
+                <a:noFill/>
+              </a:ln>
+              <a:solidFill>
+                <a:schemeClr val="tx1"/>
+              </a:solidFill>
+              <a:effectLst/>
+              <a:uLnTx/>
+              <a:uFillTx/>
+              <a:latin typeface="+mn-lt"/>
+              <a:ea typeface="+mn-ea"/>
+              <a:cs typeface="+mn-cs"/>
+            </a:endParaRPr>
+          </a:p>
+          <a:p>
+            <a:pPr marL="179388" marR="0" lvl="0" indent="-179388" algn="l" defTabSz="914400" rtl="0" eaLnBrk="1" fontAlgn="auto" latinLnBrk="0" hangingPunct="1">
+              <a:lnSpc>
+                <a:spcPct val="100000"/>
+              </a:lnSpc>
+              <a:spcBef>
+                <a:spcPct val="20000"/>
+              </a:spcBef>
+              <a:spcAft>
+                <a:spcPts val="0"/>
+              </a:spcAft>
+              <a:buClrTx/>
+              <a:buSzTx/>
+              <a:tabLst/>
+              <a:defRPr/>
+            </a:pPr>
+            <a:endParaRPr lang="en-US" sz="1200" dirty="0" smtClean="0"/>
+          </a:p>
+          <a:p>
+            <a:pPr marL="179388" marR="0" lvl="0" indent="-179388" algn="l" defTabSz="914400" rtl="0" eaLnBrk="1" fontAlgn="auto" latinLnBrk="0" hangingPunct="1">
+              <a:lnSpc>
+                <a:spcPct val="100000"/>
+              </a:lnSpc>
+              <a:spcBef>
+                <a:spcPct val="20000"/>
+              </a:spcBef>
+              <a:spcAft>
+                <a:spcPts val="0"/>
+              </a:spcAft>
+              <a:buClrTx/>
+              <a:buSzTx/>
+              <a:tabLst/>
+              <a:defRPr/>
+            </a:pPr>
+            <a:endParaRPr kumimoji="0" lang="en-US" sz="1200" b="0" i="0" u="none" strike="noStrike" kern="1200" cap="none" spc="0" normalizeH="0" baseline="0" noProof="0" dirty="0" smtClean="0">
+              <a:ln>
+                <a:noFill/>
+              </a:ln>
+              <a:solidFill>
+                <a:schemeClr val="tx1"/>
+              </a:solidFill>
+              <a:effectLst/>
+              <a:uLnTx/>
+              <a:uFillTx/>
+              <a:latin typeface="+mn-lt"/>
+              <a:ea typeface="+mn-ea"/>
+              <a:cs typeface="+mn-cs"/>
+            </a:endParaRPr>
+          </a:p>
+          <a:p>
+            <a:pPr marL="179388" marR="0" lvl="0" indent="-179388" algn="l" defTabSz="914400" rtl="0" eaLnBrk="1" fontAlgn="auto" latinLnBrk="0" hangingPunct="1">
+              <a:lnSpc>
+                <a:spcPct val="100000"/>
+              </a:lnSpc>
+              <a:spcBef>
+                <a:spcPct val="20000"/>
+              </a:spcBef>
+              <a:spcAft>
+                <a:spcPts val="0"/>
+              </a:spcAft>
+              <a:buClrTx/>
+              <a:buSzTx/>
+              <a:tabLst/>
+              <a:defRPr/>
+            </a:pPr>
+            <a:endParaRPr lang="en-US" sz="1200" dirty="0" smtClean="0"/>
+          </a:p>
+          <a:p>
+            <a:pPr marL="179388" marR="0" lvl="0" indent="-179388" algn="l" defTabSz="914400" rtl="0" eaLnBrk="1" fontAlgn="auto" latinLnBrk="0" hangingPunct="1">
+              <a:lnSpc>
+                <a:spcPct val="100000"/>
+              </a:lnSpc>
+              <a:spcBef>
+                <a:spcPct val="20000"/>
+              </a:spcBef>
+              <a:spcAft>
+                <a:spcPts val="0"/>
+              </a:spcAft>
+              <a:buClrTx/>
+              <a:buSzTx/>
+              <a:tabLst/>
+              <a:defRPr/>
+            </a:pPr>
+            <a:endParaRPr lang="en-US" sz="1200" dirty="0" smtClean="0"/>
+          </a:p>
+          <a:p>
+            <a:pPr marL="179388" marR="0" lvl="0" indent="-179388" algn="l" defTabSz="914400" rtl="0" eaLnBrk="1" fontAlgn="auto" latinLnBrk="0" hangingPunct="1">
+              <a:lnSpc>
+                <a:spcPct val="100000"/>
+              </a:lnSpc>
+              <a:spcBef>
+                <a:spcPct val="20000"/>
+              </a:spcBef>
+              <a:spcAft>
+                <a:spcPts val="0"/>
+              </a:spcAft>
+              <a:buClrTx/>
+              <a:buSzTx/>
+              <a:tabLst/>
+              <a:defRPr/>
+            </a:pPr>
+            <a:endParaRPr lang="en-US" sz="1200" dirty="0" smtClean="0"/>
+          </a:p>
+          <a:p>
+            <a:pPr marL="179388" marR="0" lvl="0" indent="-179388" algn="l" defTabSz="914400" rtl="0" eaLnBrk="1" fontAlgn="auto" latinLnBrk="0" hangingPunct="1">
+              <a:lnSpc>
+                <a:spcPct val="100000"/>
+              </a:lnSpc>
+              <a:spcBef>
+                <a:spcPct val="20000"/>
+              </a:spcBef>
+              <a:spcAft>
+                <a:spcPts val="0"/>
+              </a:spcAft>
+              <a:buClrTx/>
+              <a:buSzTx/>
+              <a:tabLst/>
+              <a:defRPr/>
+            </a:pPr>
+            <a:endParaRPr lang="en-US" sz="1200" dirty="0" smtClean="0"/>
+          </a:p>
+          <a:p>
+            <a:pPr marL="179388" marR="0" lvl="0" indent="-179388" algn="l" defTabSz="914400" rtl="0" eaLnBrk="1" fontAlgn="auto" latinLnBrk="0" hangingPunct="1">
+              <a:lnSpc>
+                <a:spcPct val="100000"/>
+              </a:lnSpc>
+              <a:spcBef>
+                <a:spcPct val="20000"/>
+              </a:spcBef>
+              <a:spcAft>
+                <a:spcPts val="0"/>
+              </a:spcAft>
+              <a:buClrTx/>
+              <a:buSzTx/>
+              <a:tabLst/>
+              <a:defRPr/>
+            </a:pPr>
+            <a:endParaRPr lang="en-US" sz="1200" dirty="0" smtClean="0"/>
+          </a:p>
+          <a:p>
+            <a:pPr marL="179388" marR="0" lvl="0" indent="-179388" algn="l" defTabSz="914400" rtl="0" eaLnBrk="1" fontAlgn="auto" latinLnBrk="0" hangingPunct="1">
+              <a:lnSpc>
+                <a:spcPct val="100000"/>
+              </a:lnSpc>
+              <a:spcBef>
+                <a:spcPct val="20000"/>
+              </a:spcBef>
+              <a:spcAft>
+                <a:spcPts val="0"/>
+              </a:spcAft>
+              <a:buClrTx/>
+              <a:buSzTx/>
+              <a:tabLst/>
+              <a:defRPr/>
+            </a:pPr>
+            <a:endParaRPr lang="en-US" sz="1200" dirty="0" smtClean="0"/>
+          </a:p>
+          <a:p>
+            <a:pPr marL="179388" marR="0" lvl="0" indent="-179388" algn="l" defTabSz="914400" rtl="0" eaLnBrk="1" fontAlgn="auto" latinLnBrk="0" hangingPunct="1">
+              <a:lnSpc>
+                <a:spcPct val="100000"/>
+              </a:lnSpc>
+              <a:spcBef>
+                <a:spcPct val="20000"/>
+              </a:spcBef>
+              <a:spcAft>
+                <a:spcPts val="0"/>
+              </a:spcAft>
+              <a:buClrTx/>
+              <a:buSzTx/>
+              <a:tabLst/>
+              <a:defRPr/>
+            </a:pPr>
+            <a:endParaRPr kumimoji="0" lang="en-US" sz="1200" b="0" i="0" u="none" strike="noStrike" kern="1200" cap="none" spc="0" normalizeH="0" baseline="0" noProof="0" dirty="0" smtClean="0">
+              <a:ln>
+                <a:noFill/>
+              </a:ln>
+              <a:solidFill>
+                <a:schemeClr val="tx1"/>
+              </a:solidFill>
+              <a:effectLst/>
+              <a:uLnTx/>
+              <a:uFillTx/>
+              <a:latin typeface="+mn-lt"/>
+              <a:ea typeface="+mn-ea"/>
+              <a:cs typeface="+mn-cs"/>
+            </a:endParaRPr>
+          </a:p>
+          <a:p>
+            <a:pPr marL="177800" indent="-177800">
+              <a:buFont typeface="Arial" pitchFamily="34" charset="0"/>
+              <a:buChar char="•"/>
+            </a:pPr>
+            <a:r>
+              <a:rPr lang="en-US" sz="1300" dirty="0" smtClean="0"/>
+              <a:t>P</a:t>
+            </a:r>
+            <a:r>
+              <a:rPr lang="en-US" sz="1300" dirty="0" smtClean="0"/>
+              <a:t>hysical </a:t>
+            </a:r>
+            <a:r>
+              <a:rPr lang="en-US" sz="1300" dirty="0" smtClean="0"/>
+              <a:t>computing </a:t>
+            </a:r>
+            <a:r>
+              <a:rPr lang="en-US" sz="1300" dirty="0" smtClean="0"/>
+              <a:t>controlled </a:t>
+            </a:r>
+            <a:r>
+              <a:rPr lang="en-US" sz="1300" dirty="0" smtClean="0"/>
+              <a:t>from Scratch. </a:t>
+            </a:r>
+            <a:endParaRPr lang="en-US" sz="1300" dirty="0" smtClean="0"/>
+          </a:p>
+          <a:p>
+            <a:pPr marL="177800" indent="-177800">
+              <a:buFont typeface="Arial" pitchFamily="34" charset="0"/>
+              <a:buChar char="•"/>
+            </a:pPr>
+            <a:r>
+              <a:rPr lang="en-US" sz="1300" dirty="0" smtClean="0"/>
+              <a:t>1 </a:t>
+            </a:r>
+            <a:r>
+              <a:rPr lang="en-US" sz="1300" dirty="0" smtClean="0"/>
+              <a:t>helper per 4 students.</a:t>
+            </a:r>
+          </a:p>
+          <a:p>
+            <a:pPr lvl="1"/>
+            <a:r>
+              <a:rPr lang="en-US" sz="1200" dirty="0" smtClean="0"/>
+              <a:t>Could also be done in 2 lessons.</a:t>
+            </a:r>
+          </a:p>
+          <a:p>
+            <a:pPr marL="179388" marR="0" lvl="0" indent="-179388" algn="l" defTabSz="914400" rtl="0" eaLnBrk="1" fontAlgn="auto" latinLnBrk="0" hangingPunct="1">
+              <a:lnSpc>
+                <a:spcPct val="100000"/>
+              </a:lnSpc>
+              <a:spcBef>
+                <a:spcPct val="20000"/>
+              </a:spcBef>
+              <a:spcAft>
+                <a:spcPts val="0"/>
+              </a:spcAft>
+              <a:buClrTx/>
+              <a:buSzTx/>
+              <a:tabLst/>
+              <a:defRPr/>
+            </a:pPr>
+            <a:endParaRPr kumimoji="0" lang="nl-NL" sz="1200" b="0" i="0" u="none" strike="noStrike" kern="1200" cap="none" spc="0" normalizeH="0" baseline="0" noProof="0" dirty="0">
               <a:ln>
                 <a:noFill/>
               </a:ln>
@@ -7413,6 +7998,58 @@
           </a:p>
         </p:txBody>
       </p:sp>
+      <p:pic>
+        <p:nvPicPr>
+          <p:cNvPr id="13313" name="Picture 1" descr="C:\Users\M5810video\Pictures\Picasa\Exports\2017-01-08\1-P1020604.JPG"/>
+          <p:cNvPicPr>
+            <a:picLocks noChangeAspect="1" noChangeArrowheads="1"/>
+          </p:cNvPicPr>
+          <p:nvPr/>
+        </p:nvPicPr>
+        <p:blipFill>
+          <a:blip r:embed="rId3" cstate="print"/>
+          <a:srcRect l="20422" t="17814" r="7173" b="15344"/>
+          <a:stretch>
+            <a:fillRect/>
+          </a:stretch>
+        </p:blipFill>
+        <p:spPr bwMode="auto">
+          <a:xfrm>
+            <a:off x="3275856" y="1203598"/>
+            <a:ext cx="2232248" cy="2747381"/>
+          </a:xfrm>
+          <a:prstGeom prst="rect">
+            <a:avLst/>
+          </a:prstGeom>
+          <a:noFill/>
+        </p:spPr>
+      </p:pic>
+      <p:pic>
+        <p:nvPicPr>
+          <p:cNvPr id="13314" name="Picture 2" descr="C:\Users\M5810video\Pictures\Picasa\Exports\2017-01-08\1-P1020606.JPG"/>
+          <p:cNvPicPr>
+            <a:picLocks noChangeAspect="1" noChangeArrowheads="1"/>
+          </p:cNvPicPr>
+          <p:nvPr/>
+        </p:nvPicPr>
+        <p:blipFill>
+          <a:blip r:embed="rId4" cstate="print"/>
+          <a:srcRect l="8724" t="5557" r="13770" b="14161"/>
+          <a:stretch>
+            <a:fillRect/>
+          </a:stretch>
+        </p:blipFill>
+        <p:spPr bwMode="auto">
+          <a:xfrm>
+            <a:off x="6156177" y="1203598"/>
+            <a:ext cx="1944216" cy="2684870"/>
+          </a:xfrm>
+          <a:prstGeom prst="rect">
+            <a:avLst/>
+          </a:prstGeom>
+          <a:noFill/>
+        </p:spPr>
+      </p:pic>
     </p:spTree>
   </p:cSld>
   <p:clrMapOvr>

</xml_diff>